<commit_message>
Tweaks to Dec 3
</commit_message>
<xml_diff>
--- a/Slides/120318.pptx
+++ b/Slides/120318.pptx
@@ -1224,10 +1224,10 @@
           </a:ln>
           <a:extLst>
             <a:ext uri="{FAA26D3D-D897-4be2-8F04-BA451C77F1D7}">
-              <ma14:placeholderFlag xmlns:ma14="http://schemas.microsoft.com/office/mac/drawingml/2011/main" xmlns="" val="1"/>
+              <ma14:placeholderFlag xmlns="" xmlns:ma14="http://schemas.microsoft.com/office/mac/drawingml/2011/main" val="1"/>
             </a:ext>
             <a:ext uri="{909E8E84-426E-40dd-AFC4-6F175D3DCCD1}">
-              <a14:hiddenFill xmlns:a14="http://schemas.microsoft.com/office/drawing/2010/main" xmlns="">
+              <a14:hiddenFill xmlns="" xmlns:a14="http://schemas.microsoft.com/office/drawing/2010/main">
                 <a:solidFill>
                   <a:srgbClr val="FFFFFF"/>
                 </a:solidFill>
@@ -1402,14 +1402,14 @@
           <a:ln/>
           <a:extLst>
             <a:ext uri="{909E8E84-426E-40dd-AFC4-6F175D3DCCD1}">
-              <a14:hiddenFill xmlns:a14="http://schemas.microsoft.com/office/drawing/2010/main" xmlns="">
+              <a14:hiddenFill xmlns="" xmlns:a14="http://schemas.microsoft.com/office/drawing/2010/main">
                 <a:solidFill>
                   <a:srgbClr val="FFFFFF"/>
                 </a:solidFill>
               </a14:hiddenFill>
             </a:ext>
             <a:ext uri="{91240B29-F687-4f45-9708-019B960494DF}">
-              <a14:hiddenLine xmlns:a14="http://schemas.microsoft.com/office/drawing/2010/main" xmlns="" w="9525">
+              <a14:hiddenLine xmlns="" xmlns:a14="http://schemas.microsoft.com/office/drawing/2010/main" w="9525">
                 <a:solidFill>
                   <a:srgbClr val="000000"/>
                 </a:solidFill>
@@ -1577,17 +1577,17 @@
           <a:ln/>
           <a:extLst>
             <a:ext uri="{FAA26D3D-D897-4be2-8F04-BA451C77F1D7}">
-              <ma14:placeholderFlag xmlns:ma14="http://schemas.microsoft.com/office/mac/drawingml/2011/main" xmlns="" val="1"/>
+              <ma14:placeholderFlag xmlns="" xmlns:ma14="http://schemas.microsoft.com/office/mac/drawingml/2011/main" val="1"/>
             </a:ext>
             <a:ext uri="{909E8E84-426E-40dd-AFC4-6F175D3DCCD1}">
-              <a14:hiddenFill xmlns:a14="http://schemas.microsoft.com/office/drawing/2010/main" xmlns="">
+              <a14:hiddenFill xmlns="" xmlns:a14="http://schemas.microsoft.com/office/drawing/2010/main">
                 <a:solidFill>
                   <a:srgbClr val="FFFFFF"/>
                 </a:solidFill>
               </a14:hiddenFill>
             </a:ext>
             <a:ext uri="{91240B29-F687-4f45-9708-019B960494DF}">
-              <a14:hiddenLine xmlns:a14="http://schemas.microsoft.com/office/drawing/2010/main" xmlns="" w="9525">
+              <a14:hiddenLine xmlns="" xmlns:a14="http://schemas.microsoft.com/office/drawing/2010/main" w="9525">
                 <a:solidFill>
                   <a:srgbClr val="000000"/>
                 </a:solidFill>
@@ -7446,17 +7446,17 @@
           </a:ln>
           <a:extLst>
             <a:ext uri="{FAA26D3D-D897-4be2-8F04-BA451C77F1D7}">
-              <ma14:placeholderFlag xmlns:ma14="http://schemas.microsoft.com/office/mac/drawingml/2011/main" xmlns="" val="1"/>
+              <ma14:placeholderFlag xmlns="" xmlns:ma14="http://schemas.microsoft.com/office/mac/drawingml/2011/main" val="1"/>
             </a:ext>
             <a:ext uri="{909E8E84-426E-40dd-AFC4-6F175D3DCCD1}">
-              <a14:hiddenFill xmlns:a14="http://schemas.microsoft.com/office/drawing/2010/main" xmlns="">
+              <a14:hiddenFill xmlns="" xmlns:a14="http://schemas.microsoft.com/office/drawing/2010/main">
                 <a:solidFill>
                   <a:srgbClr val="FFFFFF"/>
                 </a:solidFill>
               </a14:hiddenFill>
             </a:ext>
             <a:ext uri="{91240B29-F687-4f45-9708-019B960494DF}">
-              <a14:hiddenLine xmlns:a14="http://schemas.microsoft.com/office/drawing/2010/main" xmlns="" w="9525">
+              <a14:hiddenLine xmlns="" xmlns:a14="http://schemas.microsoft.com/office/drawing/2010/main" w="9525">
                 <a:solidFill>
                   <a:srgbClr val="000000"/>
                 </a:solidFill>
@@ -26576,7 +26576,7 @@
           <a:p>
             <a:r>
               <a:rPr lang="en-US" dirty="0"/>
-              <a:t>Lec#12: Explicit Congestion Notification (ECN)</a:t>
+              <a:t>Recap: Explicit Congestion Notification (ECN)</a:t>
             </a:r>
           </a:p>
         </p:txBody>
@@ -28156,7 +28156,7 @@
     <mc:Choice Requires="p14">
       <p:transition spd="slow" p14:dur="2000" advTm="108963"/>
     </mc:Choice>
-    <mc:Fallback xmlns:mv="urn:schemas-microsoft-com:mac:vml" xmlns="">
+    <mc:Fallback xmlns="" xmlns:mv="urn:schemas-microsoft-com:mac:vml">
       <mp:transition xmlns:mp="http://schemas.microsoft.com/office/mac/powerpoint/2008/main" spd="slow" advTm="108963"/>
     </mc:Fallback>
   </mc:AlternateContent>
@@ -29193,7 +29193,7 @@
     <mc:Choice Requires="p14">
       <p:transition spd="slow" p14:dur="2000" advTm="108963"/>
     </mc:Choice>
-    <mc:Fallback xmlns:mv="urn:schemas-microsoft-com:mac:vml" xmlns="">
+    <mc:Fallback xmlns="" xmlns:mv="urn:schemas-microsoft-com:mac:vml">
       <mp:transition xmlns:mp="http://schemas.microsoft.com/office/mac/powerpoint/2008/main" spd="slow" advTm="108963"/>
     </mc:Fallback>
   </mc:AlternateContent>
@@ -48318,7 +48318,7 @@
           <a:p>
             <a:r>
               <a:rPr lang="en-US" dirty="0"/>
-              <a:t>Fat-Tree topology [SIGCOMM’08]</a:t>
+              <a:t>“Fat-Tree” topology [SIGCOMM’08]</a:t>
             </a:r>
           </a:p>
         </p:txBody>

</xml_diff>